<commit_message>
Shiny App Updates and Deployment
</commit_message>
<xml_diff>
--- a/Bodyfat Group2.pptx
+++ b/Bodyfat Group2.pptx
@@ -6582,7 +6582,7 @@
             </p:custDataLst>
             <p:extLst>
               <p:ext uri="{D42A27DB-BD31-4B8C-83A1-F6EECF244321}">
-                <p14:modId xmlns:p14="http://schemas.microsoft.com/office/powerpoint/2010/main" val="4269182374"/>
+                <p14:modId xmlns:p14="http://schemas.microsoft.com/office/powerpoint/2010/main" val="2049089147"/>
               </p:ext>
             </p:extLst>
           </p:nvPr>
@@ -6705,8 +6705,8 @@
                         <a:buNone/>
                       </a:pPr>
                       <a:r>
-                        <a:rPr lang="en-US" altLang="zh-CN"/>
-                        <a:t>4.73</a:t>
+                        <a:rPr lang="en-US" altLang="zh-CN" dirty="0"/>
+                        <a:t>4.6</a:t>
                       </a:r>
                     </a:p>
                   </a:txBody>
@@ -6722,7 +6722,7 @@
                       </a:pPr>
                       <a:r>
                         <a:rPr lang="en-US" altLang="zh-CN" dirty="0"/>
-                        <a:t>4.73</a:t>
+                        <a:t>4.6</a:t>
                       </a:r>
                     </a:p>
                   </a:txBody>

</xml_diff>